<commit_message>
figures and description of basic deployment
</commit_message>
<xml_diff>
--- a/introPics.pptx
+++ b/introPics.pptx
@@ -7,6 +7,7 @@
   <p:sldIdLst>
     <p:sldId id="256" r:id="rId2"/>
     <p:sldId id="257" r:id="rId3"/>
+    <p:sldId id="258" r:id="rId4"/>
   </p:sldIdLst>
   <p:sldSz cx="9144000" cy="6858000" type="screen4x3"/>
   <p:notesSz cx="6858000" cy="9144000"/>
@@ -4512,10 +4513,1105 @@
           <a:chExt cx="0" cy="0"/>
         </a:xfrm>
       </p:grpSpPr>
+      <p:pic>
+        <p:nvPicPr>
+          <p:cNvPr id="21" name="Picture 20"/>
+          <p:cNvPicPr>
+            <a:picLocks noChangeAspect="1"/>
+          </p:cNvPicPr>
+          <p:nvPr/>
+        </p:nvPicPr>
+        <p:blipFill>
+          <a:blip r:embed="rId2"/>
+          <a:stretch>
+            <a:fillRect/>
+          </a:stretch>
+        </p:blipFill>
+        <p:spPr>
+          <a:xfrm>
+            <a:off x="5916707" y="3073684"/>
+            <a:ext cx="1687098" cy="1122687"/>
+          </a:xfrm>
+          <a:prstGeom prst="rect">
+            <a:avLst/>
+          </a:prstGeom>
+        </p:spPr>
+      </p:pic>
+      <p:pic>
+        <p:nvPicPr>
+          <p:cNvPr id="17" name="Picture 16"/>
+          <p:cNvPicPr>
+            <a:picLocks noChangeAspect="1"/>
+          </p:cNvPicPr>
+          <p:nvPr/>
+        </p:nvPicPr>
+        <p:blipFill>
+          <a:blip r:embed="rId3"/>
+          <a:stretch>
+            <a:fillRect/>
+          </a:stretch>
+        </p:blipFill>
+        <p:spPr>
+          <a:xfrm>
+            <a:off x="-29883" y="3201147"/>
+            <a:ext cx="1449294" cy="1449294"/>
+          </a:xfrm>
+          <a:prstGeom prst="rect">
+            <a:avLst/>
+          </a:prstGeom>
+        </p:spPr>
+      </p:pic>
+      <p:pic>
+        <p:nvPicPr>
+          <p:cNvPr id="4" name="Picture 3"/>
+          <p:cNvPicPr>
+            <a:picLocks noChangeAspect="1"/>
+          </p:cNvPicPr>
+          <p:nvPr/>
+        </p:nvPicPr>
+        <p:blipFill>
+          <a:blip r:embed="rId4"/>
+          <a:stretch>
+            <a:fillRect/>
+          </a:stretch>
+        </p:blipFill>
+        <p:spPr>
+          <a:xfrm>
+            <a:off x="3494741" y="1762248"/>
+            <a:ext cx="1391024" cy="1113928"/>
+          </a:xfrm>
+          <a:prstGeom prst="rect">
+            <a:avLst/>
+          </a:prstGeom>
+        </p:spPr>
+      </p:pic>
+      <p:sp>
+        <p:nvSpPr>
+          <p:cNvPr id="5" name="TextBox 4"/>
+          <p:cNvSpPr txBox="1"/>
+          <p:nvPr/>
+        </p:nvSpPr>
+        <p:spPr>
+          <a:xfrm>
+            <a:off x="4616822" y="1392916"/>
+            <a:ext cx="896471" cy="369332"/>
+          </a:xfrm>
+          <a:prstGeom prst="rect">
+            <a:avLst/>
+          </a:prstGeom>
+          <a:noFill/>
+        </p:spPr>
+        <p:txBody>
+          <a:bodyPr wrap="square" rtlCol="0">
+            <a:spAutoFit/>
+          </a:bodyPr>
+          <a:lstStyle/>
+          <a:p>
+            <a:r>
+              <a:rPr lang="en-US" dirty="0" smtClean="0"/>
+              <a:t>WAN</a:t>
+            </a:r>
+            <a:endParaRPr lang="en-US" dirty="0"/>
+          </a:p>
+        </p:txBody>
+      </p:sp>
+      <p:cxnSp>
+        <p:nvCxnSpPr>
+          <p:cNvPr id="7" name="Straight Connector 6"/>
+          <p:cNvCxnSpPr/>
+          <p:nvPr/>
+        </p:nvCxnSpPr>
+        <p:spPr>
+          <a:xfrm flipH="1">
+            <a:off x="4482353" y="1270000"/>
+            <a:ext cx="179294" cy="881529"/>
+          </a:xfrm>
+          <a:prstGeom prst="line">
+            <a:avLst/>
+          </a:prstGeom>
+        </p:spPr>
+        <p:style>
+          <a:lnRef idx="2">
+            <a:schemeClr val="accent1"/>
+          </a:lnRef>
+          <a:fillRef idx="0">
+            <a:schemeClr val="accent1"/>
+          </a:fillRef>
+          <a:effectRef idx="1">
+            <a:schemeClr val="accent1"/>
+          </a:effectRef>
+          <a:fontRef idx="minor">
+            <a:schemeClr val="tx1"/>
+          </a:fontRef>
+        </p:style>
+      </p:cxnSp>
+      <p:sp>
+        <p:nvSpPr>
+          <p:cNvPr id="10" name="Cloud 9"/>
+          <p:cNvSpPr/>
+          <p:nvPr/>
+        </p:nvSpPr>
+        <p:spPr>
+          <a:xfrm>
+            <a:off x="4661647" y="2334557"/>
+            <a:ext cx="1957295" cy="1083237"/>
+          </a:xfrm>
+          <a:prstGeom prst="cloud">
+            <a:avLst/>
+          </a:prstGeom>
+        </p:spPr>
+        <p:style>
+          <a:lnRef idx="1">
+            <a:schemeClr val="accent1"/>
+          </a:lnRef>
+          <a:fillRef idx="3">
+            <a:schemeClr val="accent1"/>
+          </a:fillRef>
+          <a:effectRef idx="2">
+            <a:schemeClr val="accent1"/>
+          </a:effectRef>
+          <a:fontRef idx="minor">
+            <a:schemeClr val="lt1"/>
+          </a:fontRef>
+        </p:style>
+        <p:txBody>
+          <a:bodyPr rtlCol="0" anchor="ctr"/>
+          <a:lstStyle/>
+          <a:p>
+            <a:pPr algn="ctr"/>
+            <a:endParaRPr lang="en-US"/>
+          </a:p>
+        </p:txBody>
+      </p:sp>
+      <p:sp>
+        <p:nvSpPr>
+          <p:cNvPr id="11" name="TextBox 10"/>
+          <p:cNvSpPr txBox="1"/>
+          <p:nvPr/>
+        </p:nvSpPr>
+        <p:spPr>
+          <a:xfrm>
+            <a:off x="5334001" y="2691510"/>
+            <a:ext cx="769637" cy="369332"/>
+          </a:xfrm>
+          <a:prstGeom prst="rect">
+            <a:avLst/>
+          </a:prstGeom>
+          <a:noFill/>
+        </p:spPr>
+        <p:txBody>
+          <a:bodyPr wrap="none" rtlCol="0">
+            <a:spAutoFit/>
+          </a:bodyPr>
+          <a:lstStyle/>
+          <a:p>
+            <a:r>
+              <a:rPr lang="en-US" dirty="0" smtClean="0"/>
+              <a:t>WLAN</a:t>
+            </a:r>
+            <a:endParaRPr lang="en-US" dirty="0"/>
+          </a:p>
+        </p:txBody>
+      </p:sp>
+      <p:cxnSp>
+        <p:nvCxnSpPr>
+          <p:cNvPr id="13" name="Straight Connector 12"/>
+          <p:cNvCxnSpPr/>
+          <p:nvPr/>
+        </p:nvCxnSpPr>
+        <p:spPr>
+          <a:xfrm flipH="1" flipV="1">
+            <a:off x="433294" y="3048462"/>
+            <a:ext cx="3843296" cy="72606"/>
+          </a:xfrm>
+          <a:prstGeom prst="line">
+            <a:avLst/>
+          </a:prstGeom>
+        </p:spPr>
+        <p:style>
+          <a:lnRef idx="2">
+            <a:schemeClr val="accent1"/>
+          </a:lnRef>
+          <a:fillRef idx="0">
+            <a:schemeClr val="accent1"/>
+          </a:fillRef>
+          <a:effectRef idx="1">
+            <a:schemeClr val="accent1"/>
+          </a:effectRef>
+          <a:fontRef idx="minor">
+            <a:schemeClr val="tx1"/>
+          </a:fontRef>
+        </p:style>
+      </p:cxnSp>
+      <p:cxnSp>
+        <p:nvCxnSpPr>
+          <p:cNvPr id="15" name="Straight Connector 14"/>
+          <p:cNvCxnSpPr/>
+          <p:nvPr/>
+        </p:nvCxnSpPr>
+        <p:spPr>
+          <a:xfrm flipV="1">
+            <a:off x="3660588" y="2691510"/>
+            <a:ext cx="254000" cy="369332"/>
+          </a:xfrm>
+          <a:prstGeom prst="line">
+            <a:avLst/>
+          </a:prstGeom>
+        </p:spPr>
+        <p:style>
+          <a:lnRef idx="2">
+            <a:schemeClr val="accent1"/>
+          </a:lnRef>
+          <a:fillRef idx="0">
+            <a:schemeClr val="accent1"/>
+          </a:fillRef>
+          <a:effectRef idx="1">
+            <a:schemeClr val="accent1"/>
+          </a:effectRef>
+          <a:fontRef idx="minor">
+            <a:schemeClr val="tx1"/>
+          </a:fontRef>
+        </p:style>
+      </p:cxnSp>
+      <p:cxnSp>
+        <p:nvCxnSpPr>
+          <p:cNvPr id="18" name="Straight Connector 17"/>
+          <p:cNvCxnSpPr/>
+          <p:nvPr/>
+        </p:nvCxnSpPr>
+        <p:spPr>
+          <a:xfrm flipV="1">
+            <a:off x="735105" y="3020215"/>
+            <a:ext cx="254000" cy="369332"/>
+          </a:xfrm>
+          <a:prstGeom prst="line">
+            <a:avLst/>
+          </a:prstGeom>
+        </p:spPr>
+        <p:style>
+          <a:lnRef idx="2">
+            <a:schemeClr val="accent1"/>
+          </a:lnRef>
+          <a:fillRef idx="0">
+            <a:schemeClr val="accent1"/>
+          </a:fillRef>
+          <a:effectRef idx="1">
+            <a:schemeClr val="accent1"/>
+          </a:effectRef>
+          <a:fontRef idx="minor">
+            <a:schemeClr val="tx1"/>
+          </a:fontRef>
+        </p:style>
+      </p:cxnSp>
+      <p:cxnSp>
+        <p:nvCxnSpPr>
+          <p:cNvPr id="19" name="Straight Connector 18"/>
+          <p:cNvCxnSpPr>
+            <a:stCxn id="29" idx="0"/>
+          </p:cNvCxnSpPr>
+          <p:nvPr/>
+        </p:nvCxnSpPr>
+        <p:spPr>
+          <a:xfrm flipV="1">
+            <a:off x="2828638" y="3073684"/>
+            <a:ext cx="551193" cy="1286577"/>
+          </a:xfrm>
+          <a:prstGeom prst="line">
+            <a:avLst/>
+          </a:prstGeom>
+        </p:spPr>
+        <p:style>
+          <a:lnRef idx="2">
+            <a:schemeClr val="accent1"/>
+          </a:lnRef>
+          <a:fillRef idx="0">
+            <a:schemeClr val="accent1"/>
+          </a:fillRef>
+          <a:effectRef idx="1">
+            <a:schemeClr val="accent1"/>
+          </a:effectRef>
+          <a:fontRef idx="minor">
+            <a:schemeClr val="tx1"/>
+          </a:fontRef>
+        </p:style>
+      </p:cxnSp>
+      <p:pic>
+        <p:nvPicPr>
+          <p:cNvPr id="22" name="Picture 21"/>
+          <p:cNvPicPr>
+            <a:picLocks noChangeAspect="1"/>
+          </p:cNvPicPr>
+          <p:nvPr/>
+        </p:nvPicPr>
+        <p:blipFill>
+          <a:blip r:embed="rId5"/>
+          <a:stretch>
+            <a:fillRect/>
+          </a:stretch>
+        </p:blipFill>
+        <p:spPr>
+          <a:xfrm rot="5400000">
+            <a:off x="3431298" y="3611689"/>
+            <a:ext cx="966580" cy="724002"/>
+          </a:xfrm>
+          <a:prstGeom prst="rect">
+            <a:avLst/>
+          </a:prstGeom>
+        </p:spPr>
+      </p:pic>
+      <p:cxnSp>
+        <p:nvCxnSpPr>
+          <p:cNvPr id="23" name="Straight Connector 22"/>
+          <p:cNvCxnSpPr/>
+          <p:nvPr/>
+        </p:nvCxnSpPr>
+        <p:spPr>
+          <a:xfrm flipV="1">
+            <a:off x="4034118" y="3121069"/>
+            <a:ext cx="107576" cy="369330"/>
+          </a:xfrm>
+          <a:prstGeom prst="line">
+            <a:avLst/>
+          </a:prstGeom>
+        </p:spPr>
+        <p:style>
+          <a:lnRef idx="2">
+            <a:schemeClr val="accent1"/>
+          </a:lnRef>
+          <a:fillRef idx="0">
+            <a:schemeClr val="accent1"/>
+          </a:fillRef>
+          <a:effectRef idx="1">
+            <a:schemeClr val="accent1"/>
+          </a:effectRef>
+          <a:fontRef idx="minor">
+            <a:schemeClr val="tx1"/>
+          </a:fontRef>
+        </p:style>
+      </p:cxnSp>
+      <p:sp>
+        <p:nvSpPr>
+          <p:cNvPr id="26" name="Cloud 25"/>
+          <p:cNvSpPr/>
+          <p:nvPr/>
+        </p:nvSpPr>
+        <p:spPr>
+          <a:xfrm>
+            <a:off x="3857813" y="4034517"/>
+            <a:ext cx="1426882" cy="844926"/>
+          </a:xfrm>
+          <a:prstGeom prst="cloud">
+            <a:avLst/>
+          </a:prstGeom>
+        </p:spPr>
+        <p:style>
+          <a:lnRef idx="1">
+            <a:schemeClr val="accent1"/>
+          </a:lnRef>
+          <a:fillRef idx="3">
+            <a:schemeClr val="accent1"/>
+          </a:fillRef>
+          <a:effectRef idx="2">
+            <a:schemeClr val="accent1"/>
+          </a:effectRef>
+          <a:fontRef idx="minor">
+            <a:schemeClr val="lt1"/>
+          </a:fontRef>
+        </p:style>
+        <p:txBody>
+          <a:bodyPr rtlCol="0" anchor="ctr"/>
+          <a:lstStyle/>
+          <a:p>
+            <a:pPr algn="ctr"/>
+            <a:r>
+              <a:rPr lang="en-US" sz="1600" dirty="0" err="1" smtClean="0"/>
+              <a:t>LoWPAN</a:t>
+            </a:r>
+            <a:endParaRPr lang="en-US" sz="1600" dirty="0"/>
+          </a:p>
+        </p:txBody>
+      </p:sp>
+      <p:pic>
+        <p:nvPicPr>
+          <p:cNvPr id="27" name="Picture 26"/>
+          <p:cNvPicPr>
+            <a:picLocks noChangeAspect="1"/>
+          </p:cNvPicPr>
+          <p:nvPr/>
+        </p:nvPicPr>
+        <p:blipFill>
+          <a:blip r:embed="rId6"/>
+          <a:stretch>
+            <a:fillRect/>
+          </a:stretch>
+        </p:blipFill>
+        <p:spPr>
+          <a:xfrm>
+            <a:off x="5141470" y="4225533"/>
+            <a:ext cx="1102234" cy="1077956"/>
+          </a:xfrm>
+          <a:prstGeom prst="rect">
+            <a:avLst/>
+          </a:prstGeom>
+        </p:spPr>
+      </p:pic>
+      <p:pic>
+        <p:nvPicPr>
+          <p:cNvPr id="29" name="Picture 28" descr="Screen Shot 2014-08-29 at 4.40.21 PM.png"/>
+          <p:cNvPicPr>
+            <a:picLocks noChangeAspect="1"/>
+          </p:cNvPicPr>
+          <p:nvPr/>
+        </p:nvPicPr>
+        <p:blipFill>
+          <a:blip r:embed="rId7">
+            <a:extLst>
+              <a:ext uri="{28A0092B-C50C-407E-A947-70E740481C1C}">
+                <a14:useLocalDpi xmlns:a14="http://schemas.microsoft.com/office/drawing/2010/main" val="0"/>
+              </a:ext>
+            </a:extLst>
+          </a:blip>
+          <a:stretch>
+            <a:fillRect/>
+          </a:stretch>
+        </p:blipFill>
+        <p:spPr>
+          <a:xfrm>
+            <a:off x="2277444" y="4360261"/>
+            <a:ext cx="1102387" cy="778783"/>
+          </a:xfrm>
+          <a:prstGeom prst="rect">
+            <a:avLst/>
+          </a:prstGeom>
+        </p:spPr>
+      </p:pic>
+      <p:pic>
+        <p:nvPicPr>
+          <p:cNvPr id="31" name="Picture 30"/>
+          <p:cNvPicPr>
+            <a:picLocks noChangeAspect="1"/>
+          </p:cNvPicPr>
+          <p:nvPr/>
+        </p:nvPicPr>
+        <p:blipFill>
+          <a:blip r:embed="rId8"/>
+          <a:stretch>
+            <a:fillRect/>
+          </a:stretch>
+        </p:blipFill>
+        <p:spPr>
+          <a:xfrm>
+            <a:off x="1100080" y="4360261"/>
+            <a:ext cx="1042895" cy="984232"/>
+          </a:xfrm>
+          <a:prstGeom prst="rect">
+            <a:avLst/>
+          </a:prstGeom>
+        </p:spPr>
+      </p:pic>
+      <p:cxnSp>
+        <p:nvCxnSpPr>
+          <p:cNvPr id="34" name="Straight Connector 33"/>
+          <p:cNvCxnSpPr/>
+          <p:nvPr/>
+        </p:nvCxnSpPr>
+        <p:spPr>
+          <a:xfrm flipV="1">
+            <a:off x="1726251" y="3091585"/>
+            <a:ext cx="551193" cy="1286577"/>
+          </a:xfrm>
+          <a:prstGeom prst="line">
+            <a:avLst/>
+          </a:prstGeom>
+        </p:spPr>
+        <p:style>
+          <a:lnRef idx="2">
+            <a:schemeClr val="accent1"/>
+          </a:lnRef>
+          <a:fillRef idx="0">
+            <a:schemeClr val="accent1"/>
+          </a:fillRef>
+          <a:effectRef idx="1">
+            <a:schemeClr val="accent1"/>
+          </a:effectRef>
+          <a:fontRef idx="minor">
+            <a:schemeClr val="tx1"/>
+          </a:fontRef>
+        </p:style>
+      </p:cxnSp>
+      <p:sp>
+        <p:nvSpPr>
+          <p:cNvPr id="37" name="TextBox 36"/>
+          <p:cNvSpPr txBox="1"/>
+          <p:nvPr/>
+        </p:nvSpPr>
+        <p:spPr>
+          <a:xfrm>
+            <a:off x="2344847" y="2660418"/>
+            <a:ext cx="564277" cy="369332"/>
+          </a:xfrm>
+          <a:prstGeom prst="rect">
+            <a:avLst/>
+          </a:prstGeom>
+          <a:noFill/>
+        </p:spPr>
+        <p:txBody>
+          <a:bodyPr wrap="none" rtlCol="0">
+            <a:spAutoFit/>
+          </a:bodyPr>
+          <a:lstStyle/>
+          <a:p>
+            <a:r>
+              <a:rPr lang="en-US" dirty="0" smtClean="0"/>
+              <a:t>LAN</a:t>
+            </a:r>
+            <a:endParaRPr lang="en-US" dirty="0"/>
+          </a:p>
+        </p:txBody>
+      </p:sp>
     </p:spTree>
     <p:extLst>
       <p:ext uri="{BB962C8B-B14F-4D97-AF65-F5344CB8AC3E}">
         <p14:creationId xmlns:p14="http://schemas.microsoft.com/office/powerpoint/2010/main" val="4150078941"/>
+      </p:ext>
+    </p:extLst>
+  </p:cSld>
+  <p:clrMapOvr>
+    <a:masterClrMapping/>
+  </p:clrMapOvr>
+  <p:timing>
+    <p:tnLst>
+      <p:par>
+        <p:cTn xmlns:p14="http://schemas.microsoft.com/office/powerpoint/2010/main" id="1" dur="indefinite" restart="never" nodeType="tmRoot"/>
+      </p:par>
+    </p:tnLst>
+  </p:timing>
+</p:sld>
+</file>
+
+<file path=ppt/slides/slide3.xml><?xml version="1.0" encoding="utf-8"?>
+<p:sld xmlns:a="http://schemas.openxmlformats.org/drawingml/2006/main" xmlns:r="http://schemas.openxmlformats.org/officeDocument/2006/relationships" xmlns:p="http://schemas.openxmlformats.org/presentationml/2006/main">
+  <p:cSld>
+    <p:spTree>
+      <p:nvGrpSpPr>
+        <p:cNvPr id="1" name=""/>
+        <p:cNvGrpSpPr/>
+        <p:nvPr/>
+      </p:nvGrpSpPr>
+      <p:grpSpPr>
+        <a:xfrm>
+          <a:off x="0" y="0"/>
+          <a:ext cx="0" cy="0"/>
+          <a:chOff x="0" y="0"/>
+          <a:chExt cx="0" cy="0"/>
+        </a:xfrm>
+      </p:grpSpPr>
+      <p:pic>
+        <p:nvPicPr>
+          <p:cNvPr id="21" name="Picture 20"/>
+          <p:cNvPicPr>
+            <a:picLocks noChangeAspect="1"/>
+          </p:cNvPicPr>
+          <p:nvPr/>
+        </p:nvPicPr>
+        <p:blipFill>
+          <a:blip r:embed="rId2"/>
+          <a:stretch>
+            <a:fillRect/>
+          </a:stretch>
+        </p:blipFill>
+        <p:spPr>
+          <a:xfrm>
+            <a:off x="5916707" y="3073684"/>
+            <a:ext cx="1687098" cy="1122687"/>
+          </a:xfrm>
+          <a:prstGeom prst="rect">
+            <a:avLst/>
+          </a:prstGeom>
+        </p:spPr>
+      </p:pic>
+      <p:sp>
+        <p:nvSpPr>
+          <p:cNvPr id="5" name="TextBox 4"/>
+          <p:cNvSpPr txBox="1"/>
+          <p:nvPr/>
+        </p:nvSpPr>
+        <p:spPr>
+          <a:xfrm>
+            <a:off x="4398062" y="1544426"/>
+            <a:ext cx="1486816" cy="369332"/>
+          </a:xfrm>
+          <a:prstGeom prst="rect">
+            <a:avLst/>
+          </a:prstGeom>
+          <a:noFill/>
+        </p:spPr>
+        <p:txBody>
+          <a:bodyPr wrap="square" rtlCol="0">
+            <a:spAutoFit/>
+          </a:bodyPr>
+          <a:lstStyle/>
+          <a:p>
+            <a:r>
+              <a:rPr lang="en-US" dirty="0" smtClean="0"/>
+              <a:t>WAN/LAN</a:t>
+            </a:r>
+            <a:endParaRPr lang="en-US" dirty="0"/>
+          </a:p>
+        </p:txBody>
+      </p:sp>
+      <p:sp>
+        <p:nvSpPr>
+          <p:cNvPr id="10" name="Cloud 9"/>
+          <p:cNvSpPr/>
+          <p:nvPr/>
+        </p:nvSpPr>
+        <p:spPr>
+          <a:xfrm>
+            <a:off x="4661647" y="2334557"/>
+            <a:ext cx="1957295" cy="1083237"/>
+          </a:xfrm>
+          <a:prstGeom prst="cloud">
+            <a:avLst/>
+          </a:prstGeom>
+        </p:spPr>
+        <p:style>
+          <a:lnRef idx="1">
+            <a:schemeClr val="accent1"/>
+          </a:lnRef>
+          <a:fillRef idx="3">
+            <a:schemeClr val="accent1"/>
+          </a:fillRef>
+          <a:effectRef idx="2">
+            <a:schemeClr val="accent1"/>
+          </a:effectRef>
+          <a:fontRef idx="minor">
+            <a:schemeClr val="lt1"/>
+          </a:fontRef>
+        </p:style>
+        <p:txBody>
+          <a:bodyPr rtlCol="0" anchor="ctr"/>
+          <a:lstStyle/>
+          <a:p>
+            <a:pPr algn="ctr"/>
+            <a:endParaRPr lang="en-US"/>
+          </a:p>
+        </p:txBody>
+      </p:sp>
+      <p:sp>
+        <p:nvSpPr>
+          <p:cNvPr id="11" name="TextBox 10"/>
+          <p:cNvSpPr txBox="1"/>
+          <p:nvPr/>
+        </p:nvSpPr>
+        <p:spPr>
+          <a:xfrm>
+            <a:off x="5334001" y="2691510"/>
+            <a:ext cx="769637" cy="369332"/>
+          </a:xfrm>
+          <a:prstGeom prst="rect">
+            <a:avLst/>
+          </a:prstGeom>
+          <a:noFill/>
+        </p:spPr>
+        <p:txBody>
+          <a:bodyPr wrap="none" rtlCol="0">
+            <a:spAutoFit/>
+          </a:bodyPr>
+          <a:lstStyle/>
+          <a:p>
+            <a:r>
+              <a:rPr lang="en-US" dirty="0" smtClean="0"/>
+              <a:t>WLAN</a:t>
+            </a:r>
+            <a:endParaRPr lang="en-US" dirty="0"/>
+          </a:p>
+        </p:txBody>
+      </p:sp>
+      <p:cxnSp>
+        <p:nvCxnSpPr>
+          <p:cNvPr id="13" name="Straight Connector 12"/>
+          <p:cNvCxnSpPr/>
+          <p:nvPr/>
+        </p:nvCxnSpPr>
+        <p:spPr>
+          <a:xfrm flipH="1" flipV="1">
+            <a:off x="1726251" y="3072888"/>
+            <a:ext cx="2550339" cy="48180"/>
+          </a:xfrm>
+          <a:prstGeom prst="line">
+            <a:avLst/>
+          </a:prstGeom>
+        </p:spPr>
+        <p:style>
+          <a:lnRef idx="2">
+            <a:schemeClr val="accent1"/>
+          </a:lnRef>
+          <a:fillRef idx="0">
+            <a:schemeClr val="accent1"/>
+          </a:fillRef>
+          <a:effectRef idx="1">
+            <a:schemeClr val="accent1"/>
+          </a:effectRef>
+          <a:fontRef idx="minor">
+            <a:schemeClr val="tx1"/>
+          </a:fontRef>
+        </p:style>
+      </p:cxnSp>
+      <p:cxnSp>
+        <p:nvCxnSpPr>
+          <p:cNvPr id="15" name="Straight Connector 14"/>
+          <p:cNvCxnSpPr/>
+          <p:nvPr/>
+        </p:nvCxnSpPr>
+        <p:spPr>
+          <a:xfrm flipV="1">
+            <a:off x="3857813" y="2691510"/>
+            <a:ext cx="56775" cy="400075"/>
+          </a:xfrm>
+          <a:prstGeom prst="line">
+            <a:avLst/>
+          </a:prstGeom>
+        </p:spPr>
+        <p:style>
+          <a:lnRef idx="2">
+            <a:schemeClr val="accent1"/>
+          </a:lnRef>
+          <a:fillRef idx="0">
+            <a:schemeClr val="accent1"/>
+          </a:fillRef>
+          <a:effectRef idx="1">
+            <a:schemeClr val="accent1"/>
+          </a:effectRef>
+          <a:fontRef idx="minor">
+            <a:schemeClr val="tx1"/>
+          </a:fontRef>
+        </p:style>
+      </p:cxnSp>
+      <p:cxnSp>
+        <p:nvCxnSpPr>
+          <p:cNvPr id="19" name="Straight Connector 18"/>
+          <p:cNvCxnSpPr>
+            <a:stCxn id="29" idx="0"/>
+          </p:cNvCxnSpPr>
+          <p:nvPr/>
+        </p:nvCxnSpPr>
+        <p:spPr>
+          <a:xfrm flipV="1">
+            <a:off x="2909124" y="3029750"/>
+            <a:ext cx="455766" cy="1090287"/>
+          </a:xfrm>
+          <a:prstGeom prst="line">
+            <a:avLst/>
+          </a:prstGeom>
+        </p:spPr>
+        <p:style>
+          <a:lnRef idx="2">
+            <a:schemeClr val="accent1"/>
+          </a:lnRef>
+          <a:fillRef idx="0">
+            <a:schemeClr val="accent1"/>
+          </a:fillRef>
+          <a:effectRef idx="1">
+            <a:schemeClr val="accent1"/>
+          </a:effectRef>
+          <a:fontRef idx="minor">
+            <a:schemeClr val="tx1"/>
+          </a:fontRef>
+        </p:style>
+      </p:cxnSp>
+      <p:pic>
+        <p:nvPicPr>
+          <p:cNvPr id="22" name="Picture 21"/>
+          <p:cNvPicPr>
+            <a:picLocks noChangeAspect="1"/>
+          </p:cNvPicPr>
+          <p:nvPr/>
+        </p:nvPicPr>
+        <p:blipFill>
+          <a:blip r:embed="rId3"/>
+          <a:stretch>
+            <a:fillRect/>
+          </a:stretch>
+        </p:blipFill>
+        <p:spPr>
+          <a:xfrm rot="5400000">
+            <a:off x="3431298" y="3611689"/>
+            <a:ext cx="966580" cy="724002"/>
+          </a:xfrm>
+          <a:prstGeom prst="rect">
+            <a:avLst/>
+          </a:prstGeom>
+        </p:spPr>
+      </p:pic>
+      <p:cxnSp>
+        <p:nvCxnSpPr>
+          <p:cNvPr id="23" name="Straight Connector 22"/>
+          <p:cNvCxnSpPr/>
+          <p:nvPr/>
+        </p:nvCxnSpPr>
+        <p:spPr>
+          <a:xfrm flipV="1">
+            <a:off x="4034118" y="3121069"/>
+            <a:ext cx="107576" cy="369330"/>
+          </a:xfrm>
+          <a:prstGeom prst="line">
+            <a:avLst/>
+          </a:prstGeom>
+        </p:spPr>
+        <p:style>
+          <a:lnRef idx="2">
+            <a:schemeClr val="accent1"/>
+          </a:lnRef>
+          <a:fillRef idx="0">
+            <a:schemeClr val="accent1"/>
+          </a:fillRef>
+          <a:effectRef idx="1">
+            <a:schemeClr val="accent1"/>
+          </a:effectRef>
+          <a:fontRef idx="minor">
+            <a:schemeClr val="tx1"/>
+          </a:fontRef>
+        </p:style>
+      </p:cxnSp>
+      <p:sp>
+        <p:nvSpPr>
+          <p:cNvPr id="26" name="Cloud 25"/>
+          <p:cNvSpPr/>
+          <p:nvPr/>
+        </p:nvSpPr>
+        <p:spPr>
+          <a:xfrm>
+            <a:off x="3857813" y="4034517"/>
+            <a:ext cx="1426882" cy="844926"/>
+          </a:xfrm>
+          <a:prstGeom prst="cloud">
+            <a:avLst/>
+          </a:prstGeom>
+        </p:spPr>
+        <p:style>
+          <a:lnRef idx="1">
+            <a:schemeClr val="accent1"/>
+          </a:lnRef>
+          <a:fillRef idx="3">
+            <a:schemeClr val="accent1"/>
+          </a:fillRef>
+          <a:effectRef idx="2">
+            <a:schemeClr val="accent1"/>
+          </a:effectRef>
+          <a:fontRef idx="minor">
+            <a:schemeClr val="lt1"/>
+          </a:fontRef>
+        </p:style>
+        <p:txBody>
+          <a:bodyPr rtlCol="0" anchor="ctr"/>
+          <a:lstStyle/>
+          <a:p>
+            <a:pPr algn="ctr"/>
+            <a:r>
+              <a:rPr lang="en-US" sz="1600" dirty="0" err="1" smtClean="0"/>
+              <a:t>LoWPAN</a:t>
+            </a:r>
+            <a:endParaRPr lang="en-US" sz="1600" dirty="0"/>
+          </a:p>
+        </p:txBody>
+      </p:sp>
+      <p:pic>
+        <p:nvPicPr>
+          <p:cNvPr id="27" name="Picture 26"/>
+          <p:cNvPicPr>
+            <a:picLocks noChangeAspect="1"/>
+          </p:cNvPicPr>
+          <p:nvPr/>
+        </p:nvPicPr>
+        <p:blipFill>
+          <a:blip r:embed="rId4"/>
+          <a:stretch>
+            <a:fillRect/>
+          </a:stretch>
+        </p:blipFill>
+        <p:spPr>
+          <a:xfrm>
+            <a:off x="5141470" y="4225533"/>
+            <a:ext cx="1102234" cy="1077956"/>
+          </a:xfrm>
+          <a:prstGeom prst="rect">
+            <a:avLst/>
+          </a:prstGeom>
+        </p:spPr>
+      </p:pic>
+      <p:pic>
+        <p:nvPicPr>
+          <p:cNvPr id="29" name="Picture 28" descr="Screen Shot 2014-08-29 at 4.40.21 PM.png"/>
+          <p:cNvPicPr>
+            <a:picLocks noChangeAspect="1"/>
+          </p:cNvPicPr>
+          <p:nvPr/>
+        </p:nvPicPr>
+        <p:blipFill>
+          <a:blip r:embed="rId5">
+            <a:extLst>
+              <a:ext uri="{28A0092B-C50C-407E-A947-70E740481C1C}">
+                <a14:useLocalDpi xmlns:a14="http://schemas.microsoft.com/office/drawing/2010/main" val="0"/>
+              </a:ext>
+            </a:extLst>
+          </a:blip>
+          <a:stretch>
+            <a:fillRect/>
+          </a:stretch>
+        </p:blipFill>
+        <p:spPr>
+          <a:xfrm>
+            <a:off x="2357930" y="4120037"/>
+            <a:ext cx="1102387" cy="778783"/>
+          </a:xfrm>
+          <a:prstGeom prst="rect">
+            <a:avLst/>
+          </a:prstGeom>
+        </p:spPr>
+      </p:pic>
+      <p:pic>
+        <p:nvPicPr>
+          <p:cNvPr id="31" name="Picture 30"/>
+          <p:cNvPicPr>
+            <a:picLocks noChangeAspect="1"/>
+          </p:cNvPicPr>
+          <p:nvPr/>
+        </p:nvPicPr>
+        <p:blipFill>
+          <a:blip r:embed="rId6"/>
+          <a:stretch>
+            <a:fillRect/>
+          </a:stretch>
+        </p:blipFill>
+        <p:spPr>
+          <a:xfrm>
+            <a:off x="1204803" y="3914588"/>
+            <a:ext cx="1042895" cy="984232"/>
+          </a:xfrm>
+          <a:prstGeom prst="rect">
+            <a:avLst/>
+          </a:prstGeom>
+        </p:spPr>
+      </p:pic>
+      <p:cxnSp>
+        <p:nvCxnSpPr>
+          <p:cNvPr id="34" name="Straight Connector 33"/>
+          <p:cNvCxnSpPr/>
+          <p:nvPr/>
+        </p:nvCxnSpPr>
+        <p:spPr>
+          <a:xfrm flipV="1">
+            <a:off x="1882588" y="3091586"/>
+            <a:ext cx="394856" cy="823002"/>
+          </a:xfrm>
+          <a:prstGeom prst="line">
+            <a:avLst/>
+          </a:prstGeom>
+        </p:spPr>
+        <p:style>
+          <a:lnRef idx="2">
+            <a:schemeClr val="accent1"/>
+          </a:lnRef>
+          <a:fillRef idx="0">
+            <a:schemeClr val="accent1"/>
+          </a:fillRef>
+          <a:effectRef idx="1">
+            <a:schemeClr val="accent1"/>
+          </a:effectRef>
+          <a:fontRef idx="minor">
+            <a:schemeClr val="tx1"/>
+          </a:fontRef>
+        </p:style>
+      </p:cxnSp>
+      <p:pic>
+        <p:nvPicPr>
+          <p:cNvPr id="3" name="Picture 2"/>
+          <p:cNvPicPr>
+            <a:picLocks noChangeAspect="1"/>
+          </p:cNvPicPr>
+          <p:nvPr/>
+        </p:nvPicPr>
+        <p:blipFill>
+          <a:blip r:embed="rId7"/>
+          <a:stretch>
+            <a:fillRect/>
+          </a:stretch>
+        </p:blipFill>
+        <p:spPr>
+          <a:xfrm>
+            <a:off x="3364890" y="1544426"/>
+            <a:ext cx="1147084" cy="1147084"/>
+          </a:xfrm>
+          <a:prstGeom prst="rect">
+            <a:avLst/>
+          </a:prstGeom>
+        </p:spPr>
+      </p:pic>
+      <p:cxnSp>
+        <p:nvCxnSpPr>
+          <p:cNvPr id="7" name="Straight Connector 6"/>
+          <p:cNvCxnSpPr/>
+          <p:nvPr/>
+        </p:nvCxnSpPr>
+        <p:spPr>
+          <a:xfrm flipH="1">
+            <a:off x="4156634" y="1490146"/>
+            <a:ext cx="179294" cy="627529"/>
+          </a:xfrm>
+          <a:prstGeom prst="line">
+            <a:avLst/>
+          </a:prstGeom>
+        </p:spPr>
+        <p:style>
+          <a:lnRef idx="2">
+            <a:schemeClr val="accent1"/>
+          </a:lnRef>
+          <a:fillRef idx="0">
+            <a:schemeClr val="accent1"/>
+          </a:fillRef>
+          <a:effectRef idx="1">
+            <a:schemeClr val="accent1"/>
+          </a:effectRef>
+          <a:fontRef idx="minor">
+            <a:schemeClr val="tx1"/>
+          </a:fontRef>
+        </p:style>
+      </p:cxnSp>
+      <p:sp>
+        <p:nvSpPr>
+          <p:cNvPr id="25" name="TextBox 24"/>
+          <p:cNvSpPr txBox="1"/>
+          <p:nvPr/>
+        </p:nvSpPr>
+        <p:spPr>
+          <a:xfrm>
+            <a:off x="2344847" y="2660418"/>
+            <a:ext cx="564277" cy="369332"/>
+          </a:xfrm>
+          <a:prstGeom prst="rect">
+            <a:avLst/>
+          </a:prstGeom>
+          <a:noFill/>
+        </p:spPr>
+        <p:txBody>
+          <a:bodyPr wrap="none" rtlCol="0">
+            <a:spAutoFit/>
+          </a:bodyPr>
+          <a:lstStyle/>
+          <a:p>
+            <a:r>
+              <a:rPr lang="en-US" dirty="0" smtClean="0"/>
+              <a:t>LAN</a:t>
+            </a:r>
+            <a:endParaRPr lang="en-US" dirty="0"/>
+          </a:p>
+        </p:txBody>
+      </p:sp>
+    </p:spTree>
+    <p:extLst>
+      <p:ext uri="{BB962C8B-B14F-4D97-AF65-F5344CB8AC3E}">
+        <p14:creationId xmlns:p14="http://schemas.microsoft.com/office/powerpoint/2010/main" val="86334356"/>
       </p:ext>
     </p:extLst>
   </p:cSld>

</xml_diff>